<commit_message>
minor changes in documentation
</commit_message>
<xml_diff>
--- a/Balesetek Franciországban.pptx
+++ b/Balesetek Franciországban.pptx
@@ -4843,10 +4843,20 @@
         <a:lstStyle/>
         <a:p>
           <a:r>
-            <a:rPr lang="hu-HU"/>
-            <a:t>Adatok a baleset helyszínéről (places.csv)</a:t>
+            <a:rPr lang="hu-HU" dirty="0"/>
+            <a:t>Adatok a baleset helyszínér</a:t>
           </a:r>
-          <a:endParaRPr lang="en-US"/>
+          <a:r>
+            <a:rPr lang="hu-HU" dirty="0">
+              <a:latin typeface="Abadi" panose="020B0604020104020204" pitchFamily="34" charset="0"/>
+            </a:rPr>
+            <a:t>ő</a:t>
+          </a:r>
+          <a:r>
+            <a:rPr lang="hu-HU" dirty="0"/>
+            <a:t>l (places.csv)</a:t>
+          </a:r>
+          <a:endParaRPr lang="en-US" dirty="0"/>
         </a:p>
       </dgm:t>
     </dgm:pt>
@@ -4917,10 +4927,20 @@
         <a:lstStyle/>
         <a:p>
           <a:r>
-            <a:rPr lang="hu-HU"/>
-            <a:t>Adatok a balesetről (characteristics.csv)</a:t>
+            <a:rPr lang="hu-HU" dirty="0"/>
+            <a:t>Adatok a balesetr</a:t>
           </a:r>
-          <a:endParaRPr lang="en-US"/>
+          <a:r>
+            <a:rPr lang="hu-HU" dirty="0">
+              <a:latin typeface="Abadi" panose="020B0604020104020204" pitchFamily="34" charset="0"/>
+            </a:rPr>
+            <a:t>ő</a:t>
+          </a:r>
+          <a:r>
+            <a:rPr lang="hu-HU" dirty="0"/>
+            <a:t>l (characteristics.csv)</a:t>
+          </a:r>
+          <a:endParaRPr lang="en-US" dirty="0"/>
         </a:p>
       </dgm:t>
     </dgm:pt>
@@ -4954,10 +4974,24 @@
         <a:lstStyle/>
         <a:p>
           <a:r>
-            <a:rPr lang="hu-HU"/>
-            <a:t>Időpont, fényviszonyok, típus, időjárási viszonyok, stb</a:t>
+            <a:rPr lang="hu-HU" dirty="0"/>
+            <a:t>Időpont, fényviszonyok, típus, id</a:t>
           </a:r>
-          <a:endParaRPr lang="en-US"/>
+          <a:r>
+            <a:rPr lang="hu-HU" dirty="0">
+              <a:latin typeface="Abadi" panose="020B0604020104020204" pitchFamily="34" charset="0"/>
+            </a:rPr>
+            <a:t>ő</a:t>
+          </a:r>
+          <a:r>
+            <a:rPr lang="hu-HU" dirty="0"/>
+            <a:t>járási viszonyok, </a:t>
+          </a:r>
+          <a:r>
+            <a:rPr lang="hu-HU" dirty="0" err="1"/>
+            <a:t>stb</a:t>
+          </a:r>
+          <a:endParaRPr lang="en-US" dirty="0"/>
         </a:p>
       </dgm:t>
     </dgm:pt>
@@ -4991,10 +5025,30 @@
         <a:lstStyle/>
         <a:p>
           <a:r>
-            <a:rPr lang="hu-HU"/>
-            <a:t>Adatok a résztvevőkről (users.csv)</a:t>
+            <a:rPr lang="hu-HU" dirty="0"/>
+            <a:t>Adatok a résztvev</a:t>
           </a:r>
-          <a:endParaRPr lang="en-US"/>
+          <a:r>
+            <a:rPr lang="hu-HU" dirty="0">
+              <a:latin typeface="Abadi" panose="020B0604020104020204" pitchFamily="34" charset="0"/>
+            </a:rPr>
+            <a:t>ő</a:t>
+          </a:r>
+          <a:r>
+            <a:rPr lang="hu-HU" dirty="0"/>
+            <a:t>kr</a:t>
+          </a:r>
+          <a:r>
+            <a:rPr lang="hu-HU" dirty="0">
+              <a:latin typeface="Abadi" panose="020B0604020104020204" pitchFamily="34" charset="0"/>
+            </a:rPr>
+            <a:t>ő</a:t>
+          </a:r>
+          <a:r>
+            <a:rPr lang="hu-HU" dirty="0"/>
+            <a:t>l (users.csv)</a:t>
+          </a:r>
+          <a:endParaRPr lang="en-US" dirty="0"/>
         </a:p>
       </dgm:t>
     </dgm:pt>
@@ -5028,10 +5082,24 @@
         <a:lstStyle/>
         <a:p>
           <a:r>
-            <a:rPr lang="hu-HU"/>
-            <a:t>Életkor, nem, utazás célja, védőfelszerelés, súlyosság, stb</a:t>
+            <a:rPr lang="hu-HU" dirty="0"/>
+            <a:t>Életkor, nem, utazás célja, véd</a:t>
           </a:r>
-          <a:endParaRPr lang="en-US"/>
+          <a:r>
+            <a:rPr lang="hu-HU" dirty="0">
+              <a:latin typeface="Abadi" panose="020F0502020204030204" pitchFamily="34" charset="0"/>
+            </a:rPr>
+            <a:t>ő</a:t>
+          </a:r>
+          <a:r>
+            <a:rPr lang="hu-HU" dirty="0"/>
+            <a:t>felszerelés, súlyosság, </a:t>
+          </a:r>
+          <a:r>
+            <a:rPr lang="hu-HU" dirty="0" err="1"/>
+            <a:t>stb</a:t>
+          </a:r>
+          <a:endParaRPr lang="en-US" dirty="0"/>
         </a:p>
       </dgm:t>
     </dgm:pt>
@@ -5338,8 +5406,36 @@
         <a:lstStyle/>
         <a:p>
           <a:r>
-            <a:rPr lang="en-US"/>
-            <a:t>Folytonos értékekek kategorizálása (életkor)</a:t>
+            <a:rPr lang="en-US" dirty="0" err="1"/>
+            <a:t>Folytonos</a:t>
+          </a:r>
+          <a:r>
+            <a:rPr lang="en-US" dirty="0"/>
+            <a:t> </a:t>
+          </a:r>
+          <a:r>
+            <a:rPr lang="en-US" dirty="0" err="1"/>
+            <a:t>értékekek</a:t>
+          </a:r>
+          <a:r>
+            <a:rPr lang="en-US" dirty="0"/>
+            <a:t> </a:t>
+          </a:r>
+          <a:r>
+            <a:rPr lang="en-US" dirty="0" err="1"/>
+            <a:t>kategorizálása</a:t>
+          </a:r>
+          <a:r>
+            <a:rPr lang="en-US" dirty="0"/>
+            <a:t> (</a:t>
+          </a:r>
+          <a:r>
+            <a:rPr lang="en-US" dirty="0" err="1"/>
+            <a:t>életkor</a:t>
+          </a:r>
+          <a:r>
+            <a:rPr lang="en-US" dirty="0"/>
+            <a:t>)</a:t>
           </a:r>
         </a:p>
       </dgm:t>
@@ -5374,8 +5470,50 @@
         <a:lstStyle/>
         <a:p>
           <a:r>
-            <a:rPr lang="en-US"/>
-            <a:t>Szűkebb kategóriába sorolás (jármű típusok)</a:t>
+            <a:rPr lang="en-US" dirty="0" err="1"/>
+            <a:t>Szűkebb</a:t>
+          </a:r>
+          <a:r>
+            <a:rPr lang="en-US" dirty="0"/>
+            <a:t> </a:t>
+          </a:r>
+          <a:r>
+            <a:rPr lang="en-US" dirty="0" err="1"/>
+            <a:t>kategóriába</a:t>
+          </a:r>
+          <a:r>
+            <a:rPr lang="en-US" dirty="0"/>
+            <a:t> </a:t>
+          </a:r>
+          <a:r>
+            <a:rPr lang="en-US" dirty="0" err="1"/>
+            <a:t>sorolás</a:t>
+          </a:r>
+          <a:r>
+            <a:rPr lang="en-US" dirty="0"/>
+            <a:t> (</a:t>
+          </a:r>
+          <a:r>
+            <a:rPr lang="en-US" dirty="0" err="1"/>
+            <a:t>járm</a:t>
+          </a:r>
+          <a:r>
+            <a:rPr lang="en-US" dirty="0" err="1">
+              <a:latin typeface="Abadi" panose="020B0604020104020204" pitchFamily="34" charset="0"/>
+            </a:rPr>
+            <a:t>ű</a:t>
+          </a:r>
+          <a:r>
+            <a:rPr lang="en-US" dirty="0"/>
+            <a:t> </a:t>
+          </a:r>
+          <a:r>
+            <a:rPr lang="en-US" dirty="0" err="1"/>
+            <a:t>típusok</a:t>
+          </a:r>
+          <a:r>
+            <a:rPr lang="en-US" dirty="0"/>
+            <a:t>)</a:t>
           </a:r>
         </a:p>
       </dgm:t>
@@ -5936,9 +6074,28 @@
         <a:lstStyle/>
         <a:p>
           <a:r>
-            <a:rPr lang="en-US"/>
-            <a:t>Időjárás viszonyokkal</a:t>
+            <a:rPr lang="en-US" dirty="0" err="1"/>
+            <a:t>Id</a:t>
           </a:r>
+          <a:r>
+            <a:rPr lang="en-US" dirty="0" err="1">
+              <a:latin typeface="Abadi" panose="020B0604020104020204" pitchFamily="34" charset="0"/>
+            </a:rPr>
+            <a:t>ő</a:t>
+          </a:r>
+          <a:r>
+            <a:rPr lang="en-US" dirty="0" err="1"/>
+            <a:t>járás</a:t>
+          </a:r>
+          <a:r>
+            <a:rPr lang="en-US" dirty="0"/>
+            <a:t> </a:t>
+          </a:r>
+          <a:r>
+            <a:rPr lang="en-US" dirty="0" err="1"/>
+            <a:t>viszonyokkal</a:t>
+          </a:r>
+          <a:endParaRPr lang="en-US" dirty="0"/>
         </a:p>
       </dgm:t>
     </dgm:pt>
@@ -6360,7 +6517,17 @@
         <a:p>
           <a:r>
             <a:rPr lang="en-US" dirty="0" err="1"/>
-            <a:t>Mentők</a:t>
+            <a:t>Ment</a:t>
+          </a:r>
+          <a:r>
+            <a:rPr lang="en-US" dirty="0" err="1">
+              <a:latin typeface="Abadi" panose="020B0604020104020204" pitchFamily="34" charset="0"/>
+            </a:rPr>
+            <a:t>ő</a:t>
+          </a:r>
+          <a:r>
+            <a:rPr lang="en-US" dirty="0" err="1"/>
+            <a:t>k</a:t>
           </a:r>
           <a:r>
             <a:rPr lang="en-US" dirty="0"/>
@@ -6368,7 +6535,17 @@
           </a:r>
           <a:r>
             <a:rPr lang="en-US" dirty="0" err="1"/>
-            <a:t>tűzoltók</a:t>
+            <a:t>t</a:t>
+          </a:r>
+          <a:r>
+            <a:rPr lang="en-US" dirty="0" err="1">
+              <a:latin typeface="Abadi" panose="020B0604020104020204" pitchFamily="34" charset="0"/>
+            </a:rPr>
+            <a:t>ű</a:t>
+          </a:r>
+          <a:r>
+            <a:rPr lang="en-US" dirty="0" err="1"/>
+            <a:t>zoltók</a:t>
           </a:r>
           <a:endParaRPr lang="en-US" dirty="0"/>
         </a:p>
@@ -6449,7 +6626,13 @@
           </a:r>
           <a:r>
             <a:rPr lang="en-US" dirty="0" err="1"/>
-            <a:t>tervező</a:t>
+            <a:t>tervez</a:t>
+          </a:r>
+          <a:r>
+            <a:rPr lang="en-US" dirty="0" err="1">
+              <a:latin typeface="Abadi" panose="020B0604020104020204" pitchFamily="34" charset="0"/>
+            </a:rPr>
+            <a:t>ő</a:t>
           </a:r>
           <a:r>
             <a:rPr lang="en-US" dirty="0"/>
@@ -6681,8 +6864,8 @@
       </dsp:nvSpPr>
       <dsp:spPr>
         <a:xfrm>
-          <a:off x="0" y="27396"/>
-          <a:ext cx="10058399" cy="585000"/>
+          <a:off x="0" y="72216"/>
+          <a:ext cx="10058399" cy="579149"/>
         </a:xfrm>
         <a:prstGeom prst="roundRect">
           <a:avLst/>
@@ -6723,12 +6906,12 @@
         </a:fontRef>
       </dsp:style>
       <dsp:txBody>
-        <a:bodyPr spcFirstLastPara="0" vert="horz" wrap="square" lIns="95250" tIns="95250" rIns="95250" bIns="95250" numCol="1" spcCol="1270" anchor="ctr" anchorCtr="0">
+        <a:bodyPr spcFirstLastPara="0" vert="horz" wrap="square" lIns="91440" tIns="91440" rIns="91440" bIns="91440" numCol="1" spcCol="1270" anchor="ctr" anchorCtr="0">
           <a:noAutofit/>
         </a:bodyPr>
         <a:lstStyle/>
         <a:p>
-          <a:pPr marL="0" lvl="0" indent="0" algn="l" defTabSz="1111250">
+          <a:pPr marL="0" lvl="0" indent="0" algn="l" defTabSz="1066800">
             <a:lnSpc>
               <a:spcPct val="90000"/>
             </a:lnSpc>
@@ -6741,15 +6924,15 @@
             <a:buNone/>
           </a:pPr>
           <a:r>
-            <a:rPr lang="hu-HU" sz="2500" kern="1200"/>
+            <a:rPr lang="hu-HU" sz="2400" kern="1200"/>
             <a:t>Adatok a járműről (vehicles.csv)</a:t>
           </a:r>
-          <a:endParaRPr lang="en-US" sz="2500" kern="1200"/>
+          <a:endParaRPr lang="en-US" sz="2400" kern="1200"/>
         </a:p>
       </dsp:txBody>
       <dsp:txXfrm>
-        <a:off x="28557" y="55953"/>
-        <a:ext cx="10001285" cy="527886"/>
+        <a:off x="28272" y="100488"/>
+        <a:ext cx="10001855" cy="522605"/>
       </dsp:txXfrm>
     </dsp:sp>
     <dsp:sp modelId="{2D43D111-A23F-4917-9701-B9FA5CDFB25D}">
@@ -6759,8 +6942,8 @@
       </dsp:nvSpPr>
       <dsp:spPr>
         <a:xfrm>
-          <a:off x="0" y="612396"/>
-          <a:ext cx="10058399" cy="414000"/>
+          <a:off x="0" y="651366"/>
+          <a:ext cx="10058399" cy="397440"/>
         </a:xfrm>
         <a:prstGeom prst="rect">
           <a:avLst/>
@@ -6784,12 +6967,12 @@
         <a:fontRef idx="minor"/>
       </dsp:style>
       <dsp:txBody>
-        <a:bodyPr spcFirstLastPara="0" vert="horz" wrap="square" lIns="319354" tIns="31750" rIns="177800" bIns="31750" numCol="1" spcCol="1270" anchor="t" anchorCtr="0">
+        <a:bodyPr spcFirstLastPara="0" vert="horz" wrap="square" lIns="319354" tIns="30480" rIns="170688" bIns="30480" numCol="1" spcCol="1270" anchor="t" anchorCtr="0">
           <a:noAutofit/>
         </a:bodyPr>
         <a:lstStyle/>
         <a:p>
-          <a:pPr marL="228600" lvl="1" indent="-228600" algn="l" defTabSz="889000">
+          <a:pPr marL="171450" lvl="1" indent="-171450" algn="l" defTabSz="844550">
             <a:lnSpc>
               <a:spcPct val="90000"/>
             </a:lnSpc>
@@ -6802,15 +6985,15 @@
             <a:buChar char="•"/>
           </a:pPr>
           <a:r>
-            <a:rPr lang="hu-HU" sz="2000" kern="1200"/>
+            <a:rPr lang="hu-HU" sz="1900" kern="1200"/>
             <a:t>Típus, utazók száma, manőver, ütközés, stb</a:t>
           </a:r>
-          <a:endParaRPr lang="en-US" sz="2000" kern="1200"/>
+          <a:endParaRPr lang="en-US" sz="1900" kern="1200"/>
         </a:p>
       </dsp:txBody>
       <dsp:txXfrm>
-        <a:off x="0" y="612396"/>
-        <a:ext cx="10058399" cy="414000"/>
+        <a:off x="0" y="651366"/>
+        <a:ext cx="10058399" cy="397440"/>
       </dsp:txXfrm>
     </dsp:sp>
     <dsp:sp modelId="{0A1AE800-1EB4-4AAF-BAF3-307B2E341C2F}">
@@ -6820,8 +7003,8 @@
       </dsp:nvSpPr>
       <dsp:spPr>
         <a:xfrm>
-          <a:off x="0" y="1026396"/>
-          <a:ext cx="10058399" cy="585000"/>
+          <a:off x="0" y="1048806"/>
+          <a:ext cx="10058399" cy="579149"/>
         </a:xfrm>
         <a:prstGeom prst="roundRect">
           <a:avLst/>
@@ -6862,12 +7045,12 @@
         </a:fontRef>
       </dsp:style>
       <dsp:txBody>
-        <a:bodyPr spcFirstLastPara="0" vert="horz" wrap="square" lIns="95250" tIns="95250" rIns="95250" bIns="95250" numCol="1" spcCol="1270" anchor="ctr" anchorCtr="0">
+        <a:bodyPr spcFirstLastPara="0" vert="horz" wrap="square" lIns="91440" tIns="91440" rIns="91440" bIns="91440" numCol="1" spcCol="1270" anchor="ctr" anchorCtr="0">
           <a:noAutofit/>
         </a:bodyPr>
         <a:lstStyle/>
         <a:p>
-          <a:pPr marL="0" lvl="0" indent="0" algn="l" defTabSz="1111250">
+          <a:pPr marL="0" lvl="0" indent="0" algn="l" defTabSz="1066800">
             <a:lnSpc>
               <a:spcPct val="90000"/>
             </a:lnSpc>
@@ -6880,15 +7063,25 @@
             <a:buNone/>
           </a:pPr>
           <a:r>
-            <a:rPr lang="hu-HU" sz="2500" kern="1200"/>
-            <a:t>Adatok a baleset helyszínéről (places.csv)</a:t>
+            <a:rPr lang="hu-HU" sz="2400" kern="1200" dirty="0"/>
+            <a:t>Adatok a baleset helyszínér</a:t>
           </a:r>
-          <a:endParaRPr lang="en-US" sz="2500" kern="1200"/>
+          <a:r>
+            <a:rPr lang="hu-HU" sz="2400" kern="1200" dirty="0">
+              <a:latin typeface="Abadi" panose="020B0604020104020204" pitchFamily="34" charset="0"/>
+            </a:rPr>
+            <a:t>ő</a:t>
+          </a:r>
+          <a:r>
+            <a:rPr lang="hu-HU" sz="2400" kern="1200" dirty="0"/>
+            <a:t>l (places.csv)</a:t>
+          </a:r>
+          <a:endParaRPr lang="en-US" sz="2400" kern="1200" dirty="0"/>
         </a:p>
       </dsp:txBody>
       <dsp:txXfrm>
-        <a:off x="28557" y="1054953"/>
-        <a:ext cx="10001285" cy="527886"/>
+        <a:off x="28272" y="1077078"/>
+        <a:ext cx="10001855" cy="522605"/>
       </dsp:txXfrm>
     </dsp:sp>
     <dsp:sp modelId="{FF125611-15EF-49D9-A20F-AA5712C37C9C}">
@@ -6898,8 +7091,8 @@
       </dsp:nvSpPr>
       <dsp:spPr>
         <a:xfrm>
-          <a:off x="0" y="1611396"/>
-          <a:ext cx="10058399" cy="414000"/>
+          <a:off x="0" y="1627955"/>
+          <a:ext cx="10058399" cy="397440"/>
         </a:xfrm>
         <a:prstGeom prst="rect">
           <a:avLst/>
@@ -6923,12 +7116,12 @@
         <a:fontRef idx="minor"/>
       </dsp:style>
       <dsp:txBody>
-        <a:bodyPr spcFirstLastPara="0" vert="horz" wrap="square" lIns="319354" tIns="31750" rIns="177800" bIns="31750" numCol="1" spcCol="1270" anchor="t" anchorCtr="0">
+        <a:bodyPr spcFirstLastPara="0" vert="horz" wrap="square" lIns="319354" tIns="30480" rIns="170688" bIns="30480" numCol="1" spcCol="1270" anchor="t" anchorCtr="0">
           <a:noAutofit/>
         </a:bodyPr>
         <a:lstStyle/>
         <a:p>
-          <a:pPr marL="228600" lvl="1" indent="-228600" algn="l" defTabSz="889000">
+          <a:pPr marL="171450" lvl="1" indent="-171450" algn="l" defTabSz="844550">
             <a:lnSpc>
               <a:spcPct val="90000"/>
             </a:lnSpc>
@@ -6941,15 +7134,15 @@
             <a:buChar char="•"/>
           </a:pPr>
           <a:r>
-            <a:rPr lang="hu-HU" sz="2000" kern="1200"/>
+            <a:rPr lang="hu-HU" sz="1900" kern="1200"/>
             <a:t>Út típusa, sávok száma, elhelyezkedés, infrastruktúra, stb</a:t>
           </a:r>
-          <a:endParaRPr lang="en-US" sz="2000" kern="1200"/>
+          <a:endParaRPr lang="en-US" sz="1900" kern="1200"/>
         </a:p>
       </dsp:txBody>
       <dsp:txXfrm>
-        <a:off x="0" y="1611396"/>
-        <a:ext cx="10058399" cy="414000"/>
+        <a:off x="0" y="1627955"/>
+        <a:ext cx="10058399" cy="397440"/>
       </dsp:txXfrm>
     </dsp:sp>
     <dsp:sp modelId="{1252ADEC-7F5E-4DA4-AE1A-70CABC3A2912}">
@@ -6960,7 +7153,7 @@
       <dsp:spPr>
         <a:xfrm>
           <a:off x="0" y="2025396"/>
-          <a:ext cx="10058399" cy="585000"/>
+          <a:ext cx="10058399" cy="579149"/>
         </a:xfrm>
         <a:prstGeom prst="roundRect">
           <a:avLst/>
@@ -7001,12 +7194,12 @@
         </a:fontRef>
       </dsp:style>
       <dsp:txBody>
-        <a:bodyPr spcFirstLastPara="0" vert="horz" wrap="square" lIns="95250" tIns="95250" rIns="95250" bIns="95250" numCol="1" spcCol="1270" anchor="ctr" anchorCtr="0">
+        <a:bodyPr spcFirstLastPara="0" vert="horz" wrap="square" lIns="91440" tIns="91440" rIns="91440" bIns="91440" numCol="1" spcCol="1270" anchor="ctr" anchorCtr="0">
           <a:noAutofit/>
         </a:bodyPr>
         <a:lstStyle/>
         <a:p>
-          <a:pPr marL="0" lvl="0" indent="0" algn="l" defTabSz="1111250">
+          <a:pPr marL="0" lvl="0" indent="0" algn="l" defTabSz="1066800">
             <a:lnSpc>
               <a:spcPct val="90000"/>
             </a:lnSpc>
@@ -7019,15 +7212,25 @@
             <a:buNone/>
           </a:pPr>
           <a:r>
-            <a:rPr lang="hu-HU" sz="2500" kern="1200"/>
-            <a:t>Adatok a balesetről (characteristics.csv)</a:t>
+            <a:rPr lang="hu-HU" sz="2400" kern="1200" dirty="0"/>
+            <a:t>Adatok a balesetr</a:t>
           </a:r>
-          <a:endParaRPr lang="en-US" sz="2500" kern="1200"/>
+          <a:r>
+            <a:rPr lang="hu-HU" sz="2400" kern="1200" dirty="0">
+              <a:latin typeface="Abadi" panose="020B0604020104020204" pitchFamily="34" charset="0"/>
+            </a:rPr>
+            <a:t>ő</a:t>
+          </a:r>
+          <a:r>
+            <a:rPr lang="hu-HU" sz="2400" kern="1200" dirty="0"/>
+            <a:t>l (characteristics.csv)</a:t>
+          </a:r>
+          <a:endParaRPr lang="en-US" sz="2400" kern="1200" dirty="0"/>
         </a:p>
       </dsp:txBody>
       <dsp:txXfrm>
-        <a:off x="28557" y="2053953"/>
-        <a:ext cx="10001285" cy="527886"/>
+        <a:off x="28272" y="2053668"/>
+        <a:ext cx="10001855" cy="522605"/>
       </dsp:txXfrm>
     </dsp:sp>
     <dsp:sp modelId="{1ABC3E49-340E-41BB-88AB-03A34BEDAF55}">
@@ -7037,8 +7240,8 @@
       </dsp:nvSpPr>
       <dsp:spPr>
         <a:xfrm>
-          <a:off x="0" y="2610396"/>
-          <a:ext cx="10058399" cy="414000"/>
+          <a:off x="0" y="2604546"/>
+          <a:ext cx="10058399" cy="397440"/>
         </a:xfrm>
         <a:prstGeom prst="rect">
           <a:avLst/>
@@ -7062,12 +7265,12 @@
         <a:fontRef idx="minor"/>
       </dsp:style>
       <dsp:txBody>
-        <a:bodyPr spcFirstLastPara="0" vert="horz" wrap="square" lIns="319354" tIns="31750" rIns="177800" bIns="31750" numCol="1" spcCol="1270" anchor="t" anchorCtr="0">
+        <a:bodyPr spcFirstLastPara="0" vert="horz" wrap="square" lIns="319354" tIns="30480" rIns="170688" bIns="30480" numCol="1" spcCol="1270" anchor="t" anchorCtr="0">
           <a:noAutofit/>
         </a:bodyPr>
         <a:lstStyle/>
         <a:p>
-          <a:pPr marL="228600" lvl="1" indent="-228600" algn="l" defTabSz="889000">
+          <a:pPr marL="171450" lvl="1" indent="-171450" algn="l" defTabSz="844550">
             <a:lnSpc>
               <a:spcPct val="90000"/>
             </a:lnSpc>
@@ -7080,15 +7283,29 @@
             <a:buChar char="•"/>
           </a:pPr>
           <a:r>
-            <a:rPr lang="hu-HU" sz="2000" kern="1200"/>
-            <a:t>Időpont, fényviszonyok, típus, időjárási viszonyok, stb</a:t>
+            <a:rPr lang="hu-HU" sz="1900" kern="1200" dirty="0"/>
+            <a:t>Időpont, fényviszonyok, típus, id</a:t>
           </a:r>
-          <a:endParaRPr lang="en-US" sz="2000" kern="1200"/>
+          <a:r>
+            <a:rPr lang="hu-HU" sz="1900" kern="1200" dirty="0">
+              <a:latin typeface="Abadi" panose="020B0604020104020204" pitchFamily="34" charset="0"/>
+            </a:rPr>
+            <a:t>ő</a:t>
+          </a:r>
+          <a:r>
+            <a:rPr lang="hu-HU" sz="1900" kern="1200" dirty="0"/>
+            <a:t>járási viszonyok, </a:t>
+          </a:r>
+          <a:r>
+            <a:rPr lang="hu-HU" sz="1900" kern="1200" dirty="0" err="1"/>
+            <a:t>stb</a:t>
+          </a:r>
+          <a:endParaRPr lang="en-US" sz="1900" kern="1200" dirty="0"/>
         </a:p>
       </dsp:txBody>
       <dsp:txXfrm>
-        <a:off x="0" y="2610396"/>
-        <a:ext cx="10058399" cy="414000"/>
+        <a:off x="0" y="2604546"/>
+        <a:ext cx="10058399" cy="397440"/>
       </dsp:txXfrm>
     </dsp:sp>
     <dsp:sp modelId="{CC1F1454-8D4E-431A-B1A1-9D6BA3AE9292}">
@@ -7098,8 +7315,8 @@
       </dsp:nvSpPr>
       <dsp:spPr>
         <a:xfrm>
-          <a:off x="0" y="3024396"/>
-          <a:ext cx="10058399" cy="585000"/>
+          <a:off x="0" y="3001986"/>
+          <a:ext cx="10058399" cy="579149"/>
         </a:xfrm>
         <a:prstGeom prst="roundRect">
           <a:avLst/>
@@ -7140,12 +7357,12 @@
         </a:fontRef>
       </dsp:style>
       <dsp:txBody>
-        <a:bodyPr spcFirstLastPara="0" vert="horz" wrap="square" lIns="95250" tIns="95250" rIns="95250" bIns="95250" numCol="1" spcCol="1270" anchor="ctr" anchorCtr="0">
+        <a:bodyPr spcFirstLastPara="0" vert="horz" wrap="square" lIns="91440" tIns="91440" rIns="91440" bIns="91440" numCol="1" spcCol="1270" anchor="ctr" anchorCtr="0">
           <a:noAutofit/>
         </a:bodyPr>
         <a:lstStyle/>
         <a:p>
-          <a:pPr marL="0" lvl="0" indent="0" algn="l" defTabSz="1111250">
+          <a:pPr marL="0" lvl="0" indent="0" algn="l" defTabSz="1066800">
             <a:lnSpc>
               <a:spcPct val="90000"/>
             </a:lnSpc>
@@ -7158,15 +7375,35 @@
             <a:buNone/>
           </a:pPr>
           <a:r>
-            <a:rPr lang="hu-HU" sz="2500" kern="1200"/>
-            <a:t>Adatok a résztvevőkről (users.csv)</a:t>
+            <a:rPr lang="hu-HU" sz="2400" kern="1200" dirty="0"/>
+            <a:t>Adatok a résztvev</a:t>
           </a:r>
-          <a:endParaRPr lang="en-US" sz="2500" kern="1200"/>
+          <a:r>
+            <a:rPr lang="hu-HU" sz="2400" kern="1200" dirty="0">
+              <a:latin typeface="Abadi" panose="020B0604020104020204" pitchFamily="34" charset="0"/>
+            </a:rPr>
+            <a:t>ő</a:t>
+          </a:r>
+          <a:r>
+            <a:rPr lang="hu-HU" sz="2400" kern="1200" dirty="0"/>
+            <a:t>kr</a:t>
+          </a:r>
+          <a:r>
+            <a:rPr lang="hu-HU" sz="2400" kern="1200" dirty="0">
+              <a:latin typeface="Abadi" panose="020B0604020104020204" pitchFamily="34" charset="0"/>
+            </a:rPr>
+            <a:t>ő</a:t>
+          </a:r>
+          <a:r>
+            <a:rPr lang="hu-HU" sz="2400" kern="1200" dirty="0"/>
+            <a:t>l (users.csv)</a:t>
+          </a:r>
+          <a:endParaRPr lang="en-US" sz="2400" kern="1200" dirty="0"/>
         </a:p>
       </dsp:txBody>
       <dsp:txXfrm>
-        <a:off x="28557" y="3052953"/>
-        <a:ext cx="10001285" cy="527886"/>
+        <a:off x="28272" y="3030258"/>
+        <a:ext cx="10001855" cy="522605"/>
       </dsp:txXfrm>
     </dsp:sp>
     <dsp:sp modelId="{82CE5EE7-2356-4460-9D67-D16F3C39AD9E}">
@@ -7176,8 +7413,8 @@
       </dsp:nvSpPr>
       <dsp:spPr>
         <a:xfrm>
-          <a:off x="0" y="3609396"/>
-          <a:ext cx="10058399" cy="414000"/>
+          <a:off x="0" y="3581136"/>
+          <a:ext cx="10058399" cy="397440"/>
         </a:xfrm>
         <a:prstGeom prst="rect">
           <a:avLst/>
@@ -7201,12 +7438,12 @@
         <a:fontRef idx="minor"/>
       </dsp:style>
       <dsp:txBody>
-        <a:bodyPr spcFirstLastPara="0" vert="horz" wrap="square" lIns="319354" tIns="31750" rIns="177800" bIns="31750" numCol="1" spcCol="1270" anchor="t" anchorCtr="0">
+        <a:bodyPr spcFirstLastPara="0" vert="horz" wrap="square" lIns="319354" tIns="30480" rIns="170688" bIns="30480" numCol="1" spcCol="1270" anchor="t" anchorCtr="0">
           <a:noAutofit/>
         </a:bodyPr>
         <a:lstStyle/>
         <a:p>
-          <a:pPr marL="228600" lvl="1" indent="-228600" algn="l" defTabSz="889000">
+          <a:pPr marL="171450" lvl="1" indent="-171450" algn="l" defTabSz="844550">
             <a:lnSpc>
               <a:spcPct val="90000"/>
             </a:lnSpc>
@@ -7219,15 +7456,29 @@
             <a:buChar char="•"/>
           </a:pPr>
           <a:r>
-            <a:rPr lang="hu-HU" sz="2000" kern="1200"/>
-            <a:t>Életkor, nem, utazás célja, védőfelszerelés, súlyosság, stb</a:t>
+            <a:rPr lang="hu-HU" sz="1900" kern="1200" dirty="0"/>
+            <a:t>Életkor, nem, utazás célja, véd</a:t>
           </a:r>
-          <a:endParaRPr lang="en-US" sz="2000" kern="1200"/>
+          <a:r>
+            <a:rPr lang="hu-HU" sz="1900" kern="1200" dirty="0">
+              <a:latin typeface="Abadi" panose="020F0502020204030204" pitchFamily="34" charset="0"/>
+            </a:rPr>
+            <a:t>ő</a:t>
+          </a:r>
+          <a:r>
+            <a:rPr lang="hu-HU" sz="1900" kern="1200" dirty="0"/>
+            <a:t>felszerelés, súlyosság, </a:t>
+          </a:r>
+          <a:r>
+            <a:rPr lang="hu-HU" sz="1900" kern="1200" dirty="0" err="1"/>
+            <a:t>stb</a:t>
+          </a:r>
+          <a:endParaRPr lang="en-US" sz="1900" kern="1200" dirty="0"/>
         </a:p>
       </dsp:txBody>
       <dsp:txXfrm>
-        <a:off x="0" y="3609396"/>
-        <a:ext cx="10058399" cy="414000"/>
+        <a:off x="0" y="3581136"/>
+        <a:ext cx="10058399" cy="397440"/>
       </dsp:txXfrm>
     </dsp:sp>
   </dsp:spTree>
@@ -7249,8 +7500,8 @@
       </dsp:nvSpPr>
       <dsp:spPr>
         <a:xfrm>
-          <a:off x="0" y="9845"/>
-          <a:ext cx="10058399" cy="702000"/>
+          <a:off x="0" y="39512"/>
+          <a:ext cx="10058399" cy="678600"/>
         </a:xfrm>
         <a:prstGeom prst="roundRect">
           <a:avLst/>
@@ -7291,12 +7542,12 @@
         </a:fontRef>
       </dsp:style>
       <dsp:txBody>
-        <a:bodyPr spcFirstLastPara="0" vert="horz" wrap="square" lIns="114300" tIns="114300" rIns="114300" bIns="114300" numCol="1" spcCol="1270" anchor="ctr" anchorCtr="0">
+        <a:bodyPr spcFirstLastPara="0" vert="horz" wrap="square" lIns="110490" tIns="110490" rIns="110490" bIns="110490" numCol="1" spcCol="1270" anchor="ctr" anchorCtr="0">
           <a:noAutofit/>
         </a:bodyPr>
         <a:lstStyle/>
         <a:p>
-          <a:pPr marL="0" lvl="0" indent="0" algn="l" defTabSz="1333500">
+          <a:pPr marL="0" lvl="0" indent="0" algn="l" defTabSz="1289050">
             <a:lnSpc>
               <a:spcPct val="90000"/>
             </a:lnSpc>
@@ -7309,14 +7560,14 @@
             <a:buNone/>
           </a:pPr>
           <a:r>
-            <a:rPr lang="en-US" sz="3000" kern="1200"/>
+            <a:rPr lang="en-US" sz="2900" kern="1200"/>
             <a:t>Sok adattól megváltunk</a:t>
           </a:r>
         </a:p>
       </dsp:txBody>
       <dsp:txXfrm>
-        <a:off x="34269" y="44114"/>
-        <a:ext cx="9989861" cy="633462"/>
+        <a:off x="33127" y="72639"/>
+        <a:ext cx="9992145" cy="612346"/>
       </dsp:txXfrm>
     </dsp:sp>
     <dsp:sp modelId="{0962221C-9A81-42A5-AF19-F63490303A73}">
@@ -7326,8 +7577,8 @@
       </dsp:nvSpPr>
       <dsp:spPr>
         <a:xfrm>
-          <a:off x="0" y="711845"/>
-          <a:ext cx="10058399" cy="776250"/>
+          <a:off x="0" y="718112"/>
+          <a:ext cx="10058399" cy="765382"/>
         </a:xfrm>
         <a:prstGeom prst="rect">
           <a:avLst/>
@@ -7351,7 +7602,7 @@
         <a:fontRef idx="minor"/>
       </dsp:style>
       <dsp:txBody>
-        <a:bodyPr spcFirstLastPara="0" vert="horz" wrap="square" lIns="319354" tIns="38100" rIns="213360" bIns="38100" numCol="1" spcCol="1270" anchor="t" anchorCtr="0">
+        <a:bodyPr spcFirstLastPara="0" vert="horz" wrap="square" lIns="319354" tIns="36830" rIns="206248" bIns="36830" numCol="1" spcCol="1270" anchor="t" anchorCtr="0">
           <a:noAutofit/>
         </a:bodyPr>
         <a:lstStyle/>
@@ -7393,8 +7644,8 @@
         </a:p>
       </dsp:txBody>
       <dsp:txXfrm>
-        <a:off x="0" y="711845"/>
-        <a:ext cx="10058399" cy="776250"/>
+        <a:off x="0" y="718112"/>
+        <a:ext cx="10058399" cy="765382"/>
       </dsp:txXfrm>
     </dsp:sp>
     <dsp:sp modelId="{B06532E5-3CA9-493D-974D-1088176EAC12}">
@@ -7404,8 +7655,8 @@
       </dsp:nvSpPr>
       <dsp:spPr>
         <a:xfrm>
-          <a:off x="0" y="1488096"/>
-          <a:ext cx="10058399" cy="702000"/>
+          <a:off x="0" y="1483494"/>
+          <a:ext cx="10058399" cy="678600"/>
         </a:xfrm>
         <a:prstGeom prst="roundRect">
           <a:avLst/>
@@ -7446,12 +7697,12 @@
         </a:fontRef>
       </dsp:style>
       <dsp:txBody>
-        <a:bodyPr spcFirstLastPara="0" vert="horz" wrap="square" lIns="114300" tIns="114300" rIns="114300" bIns="114300" numCol="1" spcCol="1270" anchor="ctr" anchorCtr="0">
+        <a:bodyPr spcFirstLastPara="0" vert="horz" wrap="square" lIns="110490" tIns="110490" rIns="110490" bIns="110490" numCol="1" spcCol="1270" anchor="ctr" anchorCtr="0">
           <a:noAutofit/>
         </a:bodyPr>
         <a:lstStyle/>
         <a:p>
-          <a:pPr marL="0" lvl="0" indent="0" algn="l" defTabSz="1333500">
+          <a:pPr marL="0" lvl="0" indent="0" algn="l" defTabSz="1289050">
             <a:lnSpc>
               <a:spcPct val="90000"/>
             </a:lnSpc>
@@ -7464,14 +7715,14 @@
             <a:buNone/>
           </a:pPr>
           <a:r>
-            <a:rPr lang="en-US" sz="3000" kern="1200"/>
+            <a:rPr lang="en-US" sz="2900" kern="1200"/>
             <a:t>Sok adatot átalakítottunk</a:t>
           </a:r>
         </a:p>
       </dsp:txBody>
       <dsp:txXfrm>
-        <a:off x="34269" y="1522365"/>
-        <a:ext cx="9989861" cy="633462"/>
+        <a:off x="33127" y="1516621"/>
+        <a:ext cx="9992145" cy="612346"/>
       </dsp:txXfrm>
     </dsp:sp>
     <dsp:sp modelId="{05E72BD9-11BB-49CC-ACD5-545DC32B28A2}">
@@ -7481,8 +7732,8 @@
       </dsp:nvSpPr>
       <dsp:spPr>
         <a:xfrm>
-          <a:off x="0" y="2190096"/>
-          <a:ext cx="10058399" cy="1148850"/>
+          <a:off x="0" y="2162094"/>
+          <a:ext cx="10058399" cy="1170584"/>
         </a:xfrm>
         <a:prstGeom prst="rect">
           <a:avLst/>
@@ -7506,7 +7757,7 @@
         <a:fontRef idx="minor"/>
       </dsp:style>
       <dsp:txBody>
-        <a:bodyPr spcFirstLastPara="0" vert="horz" wrap="square" lIns="319354" tIns="38100" rIns="213360" bIns="38100" numCol="1" spcCol="1270" anchor="t" anchorCtr="0">
+        <a:bodyPr spcFirstLastPara="0" vert="horz" wrap="square" lIns="319354" tIns="36830" rIns="206248" bIns="36830" numCol="1" spcCol="1270" anchor="t" anchorCtr="0">
           <a:noAutofit/>
         </a:bodyPr>
         <a:lstStyle/>
@@ -7524,8 +7775,36 @@
             <a:buChar char="•"/>
           </a:pPr>
           <a:r>
-            <a:rPr lang="en-US" sz="2300" kern="1200"/>
-            <a:t>Folytonos értékekek kategorizálása (életkor)</a:t>
+            <a:rPr lang="en-US" sz="2300" kern="1200" dirty="0" err="1"/>
+            <a:t>Folytonos</a:t>
+          </a:r>
+          <a:r>
+            <a:rPr lang="en-US" sz="2300" kern="1200" dirty="0"/>
+            <a:t> </a:t>
+          </a:r>
+          <a:r>
+            <a:rPr lang="en-US" sz="2300" kern="1200" dirty="0" err="1"/>
+            <a:t>értékekek</a:t>
+          </a:r>
+          <a:r>
+            <a:rPr lang="en-US" sz="2300" kern="1200" dirty="0"/>
+            <a:t> </a:t>
+          </a:r>
+          <a:r>
+            <a:rPr lang="en-US" sz="2300" kern="1200" dirty="0" err="1"/>
+            <a:t>kategorizálása</a:t>
+          </a:r>
+          <a:r>
+            <a:rPr lang="en-US" sz="2300" kern="1200" dirty="0"/>
+            <a:t> (</a:t>
+          </a:r>
+          <a:r>
+            <a:rPr lang="en-US" sz="2300" kern="1200" dirty="0" err="1"/>
+            <a:t>életkor</a:t>
+          </a:r>
+          <a:r>
+            <a:rPr lang="en-US" sz="2300" kern="1200" dirty="0"/>
+            <a:t>)</a:t>
           </a:r>
         </a:p>
         <a:p>
@@ -7542,8 +7821,50 @@
             <a:buChar char="•"/>
           </a:pPr>
           <a:r>
-            <a:rPr lang="en-US" sz="2300" kern="1200"/>
-            <a:t>Szűkebb kategóriába sorolás (jármű típusok)</a:t>
+            <a:rPr lang="en-US" sz="2300" kern="1200" dirty="0" err="1"/>
+            <a:t>Szűkebb</a:t>
+          </a:r>
+          <a:r>
+            <a:rPr lang="en-US" sz="2300" kern="1200" dirty="0"/>
+            <a:t> </a:t>
+          </a:r>
+          <a:r>
+            <a:rPr lang="en-US" sz="2300" kern="1200" dirty="0" err="1"/>
+            <a:t>kategóriába</a:t>
+          </a:r>
+          <a:r>
+            <a:rPr lang="en-US" sz="2300" kern="1200" dirty="0"/>
+            <a:t> </a:t>
+          </a:r>
+          <a:r>
+            <a:rPr lang="en-US" sz="2300" kern="1200" dirty="0" err="1"/>
+            <a:t>sorolás</a:t>
+          </a:r>
+          <a:r>
+            <a:rPr lang="en-US" sz="2300" kern="1200" dirty="0"/>
+            <a:t> (</a:t>
+          </a:r>
+          <a:r>
+            <a:rPr lang="en-US" sz="2300" kern="1200" dirty="0" err="1"/>
+            <a:t>járm</a:t>
+          </a:r>
+          <a:r>
+            <a:rPr lang="en-US" sz="2300" kern="1200" dirty="0" err="1">
+              <a:latin typeface="Abadi" panose="020B0604020104020204" pitchFamily="34" charset="0"/>
+            </a:rPr>
+            <a:t>ű</a:t>
+          </a:r>
+          <a:r>
+            <a:rPr lang="en-US" sz="2300" kern="1200" dirty="0"/>
+            <a:t> </a:t>
+          </a:r>
+          <a:r>
+            <a:rPr lang="en-US" sz="2300" kern="1200" dirty="0" err="1"/>
+            <a:t>típusok</a:t>
+          </a:r>
+          <a:r>
+            <a:rPr lang="en-US" sz="2300" kern="1200" dirty="0"/>
+            <a:t>)</a:t>
           </a:r>
         </a:p>
         <a:p>
@@ -7566,8 +7887,8 @@
         </a:p>
       </dsp:txBody>
       <dsp:txXfrm>
-        <a:off x="0" y="2190096"/>
-        <a:ext cx="10058399" cy="1148850"/>
+        <a:off x="0" y="2162094"/>
+        <a:ext cx="10058399" cy="1170584"/>
       </dsp:txXfrm>
     </dsp:sp>
     <dsp:sp modelId="{3EEF059B-1E45-47AB-9C8F-78CF11F3EB9D}">
@@ -7577,8 +7898,8 @@
       </dsp:nvSpPr>
       <dsp:spPr>
         <a:xfrm>
-          <a:off x="0" y="3338946"/>
-          <a:ext cx="10058399" cy="702000"/>
+          <a:off x="0" y="3332679"/>
+          <a:ext cx="10058399" cy="678600"/>
         </a:xfrm>
         <a:prstGeom prst="roundRect">
           <a:avLst/>
@@ -7619,12 +7940,12 @@
         </a:fontRef>
       </dsp:style>
       <dsp:txBody>
-        <a:bodyPr spcFirstLastPara="0" vert="horz" wrap="square" lIns="114300" tIns="114300" rIns="114300" bIns="114300" numCol="1" spcCol="1270" anchor="ctr" anchorCtr="0">
+        <a:bodyPr spcFirstLastPara="0" vert="horz" wrap="square" lIns="110490" tIns="110490" rIns="110490" bIns="110490" numCol="1" spcCol="1270" anchor="ctr" anchorCtr="0">
           <a:noAutofit/>
         </a:bodyPr>
         <a:lstStyle/>
         <a:p>
-          <a:pPr marL="0" lvl="0" indent="0" algn="l" defTabSz="1333500">
+          <a:pPr marL="0" lvl="0" indent="0" algn="l" defTabSz="1289050">
             <a:lnSpc>
               <a:spcPct val="90000"/>
             </a:lnSpc>
@@ -7637,14 +7958,14 @@
             <a:buNone/>
           </a:pPr>
           <a:r>
-            <a:rPr lang="en-US" sz="3000" kern="1200"/>
+            <a:rPr lang="en-US" sz="2900" kern="1200"/>
             <a:t>Új származtatott adatok (régió)</a:t>
           </a:r>
         </a:p>
       </dsp:txBody>
       <dsp:txXfrm>
-        <a:off x="34269" y="3373215"/>
-        <a:ext cx="9989861" cy="633462"/>
+        <a:off x="33127" y="3365806"/>
+        <a:ext cx="9992145" cy="612346"/>
       </dsp:txXfrm>
     </dsp:sp>
   </dsp:spTree>
@@ -8226,9 +8547,28 @@
             <a:buChar char="•"/>
           </a:pPr>
           <a:r>
-            <a:rPr lang="en-US" sz="1700" kern="1200"/>
-            <a:t>Időjárás viszonyokkal</a:t>
+            <a:rPr lang="en-US" sz="1700" kern="1200" dirty="0" err="1"/>
+            <a:t>Id</a:t>
           </a:r>
+          <a:r>
+            <a:rPr lang="en-US" sz="1700" kern="1200" dirty="0" err="1">
+              <a:latin typeface="Abadi" panose="020B0604020104020204" pitchFamily="34" charset="0"/>
+            </a:rPr>
+            <a:t>ő</a:t>
+          </a:r>
+          <a:r>
+            <a:rPr lang="en-US" sz="1700" kern="1200" dirty="0" err="1"/>
+            <a:t>járás</a:t>
+          </a:r>
+          <a:r>
+            <a:rPr lang="en-US" sz="1700" kern="1200" dirty="0"/>
+            <a:t> </a:t>
+          </a:r>
+          <a:r>
+            <a:rPr lang="en-US" sz="1700" kern="1200" dirty="0" err="1"/>
+            <a:t>viszonyokkal</a:t>
+          </a:r>
+          <a:endParaRPr lang="en-US" sz="1700" kern="1200" dirty="0"/>
         </a:p>
         <a:p>
           <a:pPr marL="171450" lvl="1" indent="-171450" algn="l" defTabSz="755650">
@@ -8712,7 +9052,17 @@
           </a:pPr>
           <a:r>
             <a:rPr lang="en-US" sz="2700" kern="1200" dirty="0" err="1"/>
-            <a:t>Mentők</a:t>
+            <a:t>Ment</a:t>
+          </a:r>
+          <a:r>
+            <a:rPr lang="en-US" sz="2700" kern="1200" dirty="0" err="1">
+              <a:latin typeface="Abadi" panose="020B0604020104020204" pitchFamily="34" charset="0"/>
+            </a:rPr>
+            <a:t>ő</a:t>
+          </a:r>
+          <a:r>
+            <a:rPr lang="en-US" sz="2700" kern="1200" dirty="0" err="1"/>
+            <a:t>k</a:t>
           </a:r>
           <a:r>
             <a:rPr lang="en-US" sz="2700" kern="1200" dirty="0"/>
@@ -8720,7 +9070,17 @@
           </a:r>
           <a:r>
             <a:rPr lang="en-US" sz="2700" kern="1200" dirty="0" err="1"/>
-            <a:t>tűzoltók</a:t>
+            <a:t>t</a:t>
+          </a:r>
+          <a:r>
+            <a:rPr lang="en-US" sz="2700" kern="1200" dirty="0" err="1">
+              <a:latin typeface="Abadi" panose="020B0604020104020204" pitchFamily="34" charset="0"/>
+            </a:rPr>
+            <a:t>ű</a:t>
+          </a:r>
+          <a:r>
+            <a:rPr lang="en-US" sz="2700" kern="1200" dirty="0" err="1"/>
+            <a:t>zoltók</a:t>
           </a:r>
           <a:endParaRPr lang="en-US" sz="2700" kern="1200" dirty="0"/>
         </a:p>
@@ -8900,7 +9260,13 @@
           </a:r>
           <a:r>
             <a:rPr lang="en-US" sz="2700" kern="1200" dirty="0" err="1"/>
-            <a:t>tervező</a:t>
+            <a:t>tervez</a:t>
+          </a:r>
+          <a:r>
+            <a:rPr lang="en-US" sz="2700" kern="1200" dirty="0" err="1">
+              <a:latin typeface="Abadi" panose="020B0604020104020204" pitchFamily="34" charset="0"/>
+            </a:rPr>
+            <a:t>ő</a:t>
           </a:r>
           <a:r>
             <a:rPr lang="en-US" sz="2700" kern="1200" dirty="0"/>
@@ -19284,9 +19650,17 @@
             </a:r>
             <a:r>
               <a:rPr lang="en-US" dirty="0" err="1"/>
-              <a:t>jármű</a:t>
-            </a:r>
-            <a:endParaRPr lang="en-US" dirty="0"/>
+              <a:t>járm</a:t>
+            </a:r>
+            <a:r>
+              <a:rPr lang="en-US" dirty="0" err="1">
+                <a:latin typeface="Abadi" panose="020B0604020104020204" pitchFamily="34" charset="0"/>
+              </a:rPr>
+              <a:t>ű</a:t>
+            </a:r>
+            <a:endParaRPr lang="en-US" dirty="0">
+              <a:latin typeface="Abadi" panose="020B0604020104020204" pitchFamily="34" charset="0"/>
+            </a:endParaRPr>
           </a:p>
           <a:p>
             <a:pPr lvl="2"/>
@@ -19386,7 +19760,17 @@
             </a:r>
             <a:r>
               <a:rPr lang="en-US" dirty="0" err="1"/>
-              <a:t>résztvevője</a:t>
+              <a:t>résztvev</a:t>
+            </a:r>
+            <a:r>
+              <a:rPr lang="en-US" dirty="0" err="1">
+                <a:latin typeface="Abadi" panose="020B0604020104020204" pitchFamily="34" charset="0"/>
+              </a:rPr>
+              <a:t>ő</a:t>
+            </a:r>
+            <a:r>
+              <a:rPr lang="en-US" dirty="0" err="1"/>
+              <a:t>je</a:t>
             </a:r>
             <a:r>
               <a:rPr lang="en-US" dirty="0"/>
@@ -19593,7 +19977,17 @@
             </a:r>
             <a:r>
               <a:rPr lang="hu-HU" dirty="0"/>
-              <a:t> algoritmussal (kellő evidenciával)</a:t>
+              <a:t> algoritmussal (kell</a:t>
+            </a:r>
+            <a:r>
+              <a:rPr lang="hu-HU" dirty="0">
+                <a:latin typeface="Abadi" panose="020B0604020104020204" pitchFamily="34" charset="0"/>
+              </a:rPr>
+              <a:t>ő</a:t>
+            </a:r>
+            <a:r>
+              <a:rPr lang="hu-HU" dirty="0"/>
+              <a:t> evidenciával)</a:t>
             </a:r>
           </a:p>
           <a:p>
@@ -19608,7 +20002,17 @@
             </a:r>
             <a:r>
               <a:rPr lang="hu-HU" dirty="0"/>
-              <a:t> függően</a:t>
+              <a:t> függ</a:t>
+            </a:r>
+            <a:r>
+              <a:rPr lang="hu-HU" dirty="0">
+                <a:latin typeface="Abadi" panose="020B0604020104020204" pitchFamily="34" charset="0"/>
+              </a:rPr>
+              <a:t>ő</a:t>
+            </a:r>
+            <a:r>
+              <a:rPr lang="hu-HU" dirty="0"/>
+              <a:t>en</a:t>
             </a:r>
           </a:p>
         </p:txBody>
@@ -19751,6 +20155,11 @@
           </p:cNvGraphicFramePr>
           <p:nvPr>
             <p:ph idx="1"/>
+            <p:extLst>
+              <p:ext uri="{D42A27DB-BD31-4B8C-83A1-F6EECF244321}">
+                <p14:modId xmlns:p14="http://schemas.microsoft.com/office/powerpoint/2010/main" val="3388860911"/>
+              </p:ext>
+            </p:extLst>
           </p:nvPr>
         </p:nvGraphicFramePr>
         <p:xfrm>
@@ -20059,7 +20468,17 @@
           <a:p>
             <a:r>
               <a:rPr lang="hu-HU" dirty="0"/>
-              <a:t>Későbbi eredmények ehhez hasonlíthatóak</a:t>
+              <a:t>Kés</a:t>
+            </a:r>
+            <a:r>
+              <a:rPr lang="hu-HU" dirty="0">
+                <a:latin typeface="Abadi" panose="020B0604020104020204" pitchFamily="34" charset="0"/>
+              </a:rPr>
+              <a:t>ő</a:t>
+            </a:r>
+            <a:r>
+              <a:rPr lang="hu-HU" dirty="0"/>
+              <a:t>bbi eredmények ehhez hasonlíthatóak</a:t>
             </a:r>
           </a:p>
         </p:txBody>
@@ -20145,67 +20564,332 @@
           <a:lstStyle/>
           <a:p>
             <a:r>
-              <a:rPr lang="en-US"/>
-              <a:t>Biciklisták esetén</a:t>
-            </a:r>
-          </a:p>
-          <a:p>
-            <a:pPr lvl="1"/>
-            <a:r>
-              <a:rPr lang="en-US"/>
-              <a:t>Megéri a védőfelszerelés (3.8% -&gt; 3.2% halálozás)</a:t>
-            </a:r>
-          </a:p>
-          <a:p>
-            <a:pPr lvl="1"/>
-            <a:r>
-              <a:rPr lang="en-US"/>
-              <a:t>Kétszeres esély van éjjel halálos balesetet szenvedni</a:t>
+              <a:rPr lang="en-US" dirty="0" err="1"/>
+              <a:t>Biciklisták</a:t>
+            </a:r>
+            <a:r>
+              <a:rPr lang="en-US" dirty="0"/>
+              <a:t> </a:t>
+            </a:r>
+            <a:r>
+              <a:rPr lang="en-US" dirty="0" err="1"/>
+              <a:t>esetén</a:t>
             </a:r>
             <a:endParaRPr lang="en-US" dirty="0"/>
           </a:p>
           <a:p>
             <a:pPr lvl="1"/>
             <a:r>
-              <a:rPr lang="hu-HU"/>
-              <a:t>Ile-de-Franc</a:t>
-            </a:r>
-            <a:r>
-              <a:rPr lang="en-US"/>
-              <a:t>e egy veszélyes régió</a:t>
+              <a:rPr lang="en-US" dirty="0" err="1"/>
+              <a:t>Megéri</a:t>
+            </a:r>
+            <a:r>
+              <a:rPr lang="en-US" dirty="0"/>
+              <a:t> a </a:t>
+            </a:r>
+            <a:r>
+              <a:rPr lang="en-US" dirty="0" err="1"/>
+              <a:t>véd</a:t>
+            </a:r>
+            <a:r>
+              <a:rPr lang="en-US" dirty="0" err="1">
+                <a:latin typeface="Abadi" panose="020B0604020104020204" pitchFamily="34" charset="0"/>
+              </a:rPr>
+              <a:t>ő</a:t>
+            </a:r>
+            <a:r>
+              <a:rPr lang="en-US" dirty="0" err="1"/>
+              <a:t>felszerelés</a:t>
+            </a:r>
+            <a:r>
+              <a:rPr lang="en-US" dirty="0"/>
+              <a:t> (3.8% -&gt; 3.2% </a:t>
+            </a:r>
+            <a:r>
+              <a:rPr lang="en-US" dirty="0" err="1"/>
+              <a:t>halálozás</a:t>
+            </a:r>
+            <a:r>
+              <a:rPr lang="en-US" dirty="0"/>
+              <a:t>)</a:t>
+            </a:r>
+          </a:p>
+          <a:p>
+            <a:pPr lvl="1"/>
+            <a:r>
+              <a:rPr lang="en-US" dirty="0" err="1"/>
+              <a:t>Kétszeres</a:t>
+            </a:r>
+            <a:r>
+              <a:rPr lang="en-US" dirty="0"/>
+              <a:t> </a:t>
+            </a:r>
+            <a:r>
+              <a:rPr lang="en-US" dirty="0" err="1"/>
+              <a:t>esély</a:t>
+            </a:r>
+            <a:r>
+              <a:rPr lang="en-US" dirty="0"/>
+              <a:t> van </a:t>
+            </a:r>
+            <a:r>
+              <a:rPr lang="en-US" dirty="0" err="1"/>
+              <a:t>éjjel</a:t>
+            </a:r>
+            <a:r>
+              <a:rPr lang="en-US" dirty="0"/>
+              <a:t> </a:t>
+            </a:r>
+            <a:r>
+              <a:rPr lang="en-US" dirty="0" err="1"/>
+              <a:t>halálos</a:t>
+            </a:r>
+            <a:r>
+              <a:rPr lang="en-US" dirty="0"/>
+              <a:t> </a:t>
+            </a:r>
+            <a:r>
+              <a:rPr lang="en-US" dirty="0" err="1"/>
+              <a:t>balesetet</a:t>
+            </a:r>
+            <a:r>
+              <a:rPr lang="en-US" dirty="0"/>
+              <a:t> </a:t>
+            </a:r>
+            <a:r>
+              <a:rPr lang="en-US" dirty="0" err="1"/>
+              <a:t>szenvedni</a:t>
             </a:r>
             <a:endParaRPr lang="en-US" dirty="0"/>
           </a:p>
           <a:p>
-            <a:r>
-              <a:rPr lang="en-US"/>
-              <a:t>A kórházba vitt autósok többsége 25-45 korcsoportú</a:t>
-            </a:r>
+            <a:pPr lvl="1"/>
+            <a:r>
+              <a:rPr lang="hu-HU" dirty="0" err="1"/>
+              <a:t>Ile</a:t>
+            </a:r>
+            <a:r>
+              <a:rPr lang="hu-HU" dirty="0"/>
+              <a:t>-de-Franc</a:t>
+            </a:r>
+            <a:r>
+              <a:rPr lang="en-US" dirty="0"/>
+              <a:t>e </a:t>
+            </a:r>
+            <a:r>
+              <a:rPr lang="en-US" dirty="0" err="1"/>
+              <a:t>egy</a:t>
+            </a:r>
+            <a:r>
+              <a:rPr lang="en-US" dirty="0"/>
+              <a:t> </a:t>
+            </a:r>
+            <a:r>
+              <a:rPr lang="en-US" dirty="0" err="1"/>
+              <a:t>veszélyes</a:t>
+            </a:r>
+            <a:r>
+              <a:rPr lang="en-US" dirty="0"/>
+              <a:t> </a:t>
+            </a:r>
+            <a:r>
+              <a:rPr lang="en-US" dirty="0" err="1"/>
+              <a:t>régió</a:t>
+            </a:r>
+            <a:endParaRPr lang="en-US" dirty="0"/>
           </a:p>
           <a:p>
             <a:r>
-              <a:rPr lang="en-US"/>
-              <a:t>Enyhe esőben kevésbé valószínű a sérülés</a:t>
-            </a:r>
+              <a:rPr lang="en-US" dirty="0"/>
+              <a:t>A </a:t>
+            </a:r>
+            <a:r>
+              <a:rPr lang="en-US" dirty="0" err="1"/>
+              <a:t>kórházba</a:t>
+            </a:r>
+            <a:r>
+              <a:rPr lang="en-US" dirty="0"/>
+              <a:t> </a:t>
+            </a:r>
+            <a:r>
+              <a:rPr lang="en-US" dirty="0" err="1"/>
+              <a:t>vitt</a:t>
+            </a:r>
+            <a:r>
+              <a:rPr lang="en-US" dirty="0"/>
+              <a:t> </a:t>
+            </a:r>
+            <a:r>
+              <a:rPr lang="en-US" dirty="0" err="1"/>
+              <a:t>autósok</a:t>
+            </a:r>
+            <a:r>
+              <a:rPr lang="en-US" dirty="0"/>
+              <a:t> </a:t>
+            </a:r>
+            <a:r>
+              <a:rPr lang="en-US" dirty="0" err="1"/>
+              <a:t>többsége</a:t>
+            </a:r>
+            <a:r>
+              <a:rPr lang="en-US" dirty="0"/>
+              <a:t> 25-45 </a:t>
+            </a:r>
+            <a:r>
+              <a:rPr lang="en-US" dirty="0" err="1"/>
+              <a:t>korcsoportú</a:t>
+            </a:r>
+            <a:endParaRPr lang="en-US" dirty="0"/>
           </a:p>
           <a:p>
             <a:r>
-              <a:rPr lang="en-US"/>
-              <a:t>Ugyan olyan körülményeknél</a:t>
-            </a:r>
+              <a:rPr lang="en-US" dirty="0" err="1"/>
+              <a:t>Enyhe</a:t>
+            </a:r>
+            <a:r>
+              <a:rPr lang="en-US" dirty="0"/>
+              <a:t> </a:t>
+            </a:r>
+            <a:r>
+              <a:rPr lang="en-US" dirty="0" err="1"/>
+              <a:t>esőben</a:t>
+            </a:r>
+            <a:r>
+              <a:rPr lang="en-US" dirty="0"/>
+              <a:t> </a:t>
+            </a:r>
+            <a:r>
+              <a:rPr lang="en-US" dirty="0" err="1"/>
+              <a:t>kevésbé</a:t>
+            </a:r>
+            <a:r>
+              <a:rPr lang="en-US" dirty="0"/>
+              <a:t> </a:t>
+            </a:r>
+            <a:r>
+              <a:rPr lang="en-US" dirty="0" err="1"/>
+              <a:t>valószínű</a:t>
+            </a:r>
+            <a:r>
+              <a:rPr lang="en-US" dirty="0"/>
+              <a:t> a </a:t>
+            </a:r>
+            <a:r>
+              <a:rPr lang="en-US" dirty="0" err="1"/>
+              <a:t>sérülés</a:t>
+            </a:r>
+            <a:endParaRPr lang="en-US" dirty="0"/>
+          </a:p>
+          <a:p>
+            <a:r>
+              <a:rPr lang="en-US" dirty="0" err="1"/>
+              <a:t>Ugyan</a:t>
+            </a:r>
+            <a:r>
+              <a:rPr lang="en-US" dirty="0"/>
+              <a:t> </a:t>
+            </a:r>
+            <a:r>
+              <a:rPr lang="en-US" dirty="0" err="1"/>
+              <a:t>olyan</a:t>
+            </a:r>
+            <a:r>
+              <a:rPr lang="en-US" dirty="0"/>
+              <a:t> </a:t>
+            </a:r>
+            <a:r>
+              <a:rPr lang="en-US" dirty="0" err="1"/>
+              <a:t>körülményeknél</a:t>
+            </a:r>
+            <a:endParaRPr lang="en-US" dirty="0"/>
           </a:p>
           <a:p>
             <a:pPr lvl="1"/>
             <a:r>
-              <a:rPr lang="en-US"/>
-              <a:t>Nők gyakrabban sérülnek/kerülnek kórházba</a:t>
-            </a:r>
+              <a:rPr lang="en-US" dirty="0" err="1"/>
+              <a:t>N</a:t>
+            </a:r>
+            <a:r>
+              <a:rPr lang="en-US" dirty="0" err="1">
+                <a:latin typeface="Abadi" panose="020B0604020104020204" pitchFamily="34" charset="0"/>
+              </a:rPr>
+              <a:t>ő</a:t>
+            </a:r>
+            <a:r>
+              <a:rPr lang="en-US" dirty="0" err="1"/>
+              <a:t>k</a:t>
+            </a:r>
+            <a:r>
+              <a:rPr lang="en-US" dirty="0"/>
+              <a:t> </a:t>
+            </a:r>
+            <a:r>
+              <a:rPr lang="en-US" dirty="0" err="1"/>
+              <a:t>gyakrabban</a:t>
+            </a:r>
+            <a:r>
+              <a:rPr lang="en-US" dirty="0"/>
+              <a:t> </a:t>
+            </a:r>
+            <a:r>
+              <a:rPr lang="en-US" dirty="0" err="1"/>
+              <a:t>sérülnek</a:t>
+            </a:r>
+            <a:r>
+              <a:rPr lang="en-US" dirty="0"/>
+              <a:t>/</a:t>
+            </a:r>
+            <a:r>
+              <a:rPr lang="en-US" dirty="0" err="1"/>
+              <a:t>kerülnek</a:t>
+            </a:r>
+            <a:r>
+              <a:rPr lang="en-US" dirty="0"/>
+              <a:t> </a:t>
+            </a:r>
+            <a:r>
+              <a:rPr lang="en-US" dirty="0" err="1"/>
+              <a:t>kórházba</a:t>
+            </a:r>
+            <a:endParaRPr lang="en-US" dirty="0"/>
           </a:p>
           <a:p>
             <a:pPr lvl="1"/>
             <a:r>
-              <a:rPr lang="en-US"/>
-              <a:t>Férfiak gyakrabban sértetlenek/haláloznak el</a:t>
+              <a:rPr lang="en-US" dirty="0" err="1"/>
+              <a:t>Férfiak</a:t>
+            </a:r>
+            <a:r>
+              <a:rPr lang="en-US" dirty="0"/>
+              <a:t> </a:t>
+            </a:r>
+            <a:r>
+              <a:rPr lang="en-US" dirty="0" err="1"/>
+              <a:t>gyakrabban</a:t>
+            </a:r>
+            <a:r>
+              <a:rPr lang="en-US" dirty="0"/>
+              <a:t> </a:t>
+            </a:r>
+            <a:r>
+              <a:rPr lang="en-US" dirty="0" err="1"/>
+              <a:t>sértetlenek</a:t>
+            </a:r>
+            <a:r>
+              <a:rPr lang="en-US" dirty="0"/>
+              <a:t>/</a:t>
+            </a:r>
+            <a:r>
+              <a:rPr lang="en-US" dirty="0" err="1"/>
+              <a:t>haláloznak</a:t>
+            </a:r>
+            <a:r>
+              <a:rPr lang="en-US" dirty="0"/>
+              <a:t> </a:t>
+            </a:r>
+            <a:r>
+              <a:rPr lang="en-US" dirty="0" err="1"/>
+              <a:t>el</a:t>
             </a:r>
             <a:endParaRPr lang="hu-HU" dirty="0"/>
           </a:p>
@@ -20300,14 +20984,34 @@
             <a:pPr lvl="1"/>
             <a:r>
               <a:rPr lang="hu-HU" dirty="0"/>
-              <a:t>Olvasott irodalom alapján jelentős faktor baleset előfordulása és súlyossága terén is</a:t>
+              <a:t>Olvasott irodalom alapján jelent</a:t>
+            </a:r>
+            <a:r>
+              <a:rPr lang="hu-HU" dirty="0">
+                <a:latin typeface="Abadi" panose="020B0604020104020204" pitchFamily="34" charset="0"/>
+              </a:rPr>
+              <a:t>ő</a:t>
+            </a:r>
+            <a:r>
+              <a:rPr lang="hu-HU" dirty="0"/>
+              <a:t>s faktor baleset előfordulása és súlyossága terén is</a:t>
             </a:r>
           </a:p>
           <a:p>
             <a:pPr lvl="1"/>
             <a:r>
               <a:rPr lang="hu-HU" dirty="0"/>
-              <a:t>Az adathalmazban nincsen adat erről </a:t>
+              <a:t>Az adathalmazban nincsen adat err</a:t>
+            </a:r>
+            <a:r>
+              <a:rPr lang="hu-HU" dirty="0">
+                <a:latin typeface="Abadi" panose="020B0604020104020204" pitchFamily="34" charset="0"/>
+              </a:rPr>
+              <a:t>ő</a:t>
+            </a:r>
+            <a:r>
+              <a:rPr lang="hu-HU" dirty="0"/>
+              <a:t>l </a:t>
             </a:r>
           </a:p>
           <a:p>
@@ -20412,6 +21116,11 @@
           </p:cNvGraphicFramePr>
           <p:nvPr>
             <p:ph idx="1"/>
+            <p:extLst>
+              <p:ext uri="{D42A27DB-BD31-4B8C-83A1-F6EECF244321}">
+                <p14:modId xmlns:p14="http://schemas.microsoft.com/office/powerpoint/2010/main" val="4011332576"/>
+              </p:ext>
+            </p:extLst>
           </p:nvPr>
         </p:nvGraphicFramePr>
         <p:xfrm>
@@ -21473,6 +22182,11 @@
           </p:cNvGraphicFramePr>
           <p:nvPr>
             <p:ph idx="1"/>
+            <p:extLst>
+              <p:ext uri="{D42A27DB-BD31-4B8C-83A1-F6EECF244321}">
+                <p14:modId xmlns:p14="http://schemas.microsoft.com/office/powerpoint/2010/main" val="198800460"/>
+              </p:ext>
+            </p:extLst>
           </p:nvPr>
         </p:nvGraphicFramePr>
         <p:xfrm>
@@ -21557,6 +22271,11 @@
           </p:cNvGraphicFramePr>
           <p:nvPr>
             <p:ph idx="1"/>
+            <p:extLst>
+              <p:ext uri="{D42A27DB-BD31-4B8C-83A1-F6EECF244321}">
+                <p14:modId xmlns:p14="http://schemas.microsoft.com/office/powerpoint/2010/main" val="1685700309"/>
+              </p:ext>
+            </p:extLst>
           </p:nvPr>
         </p:nvGraphicFramePr>
         <p:xfrm>
@@ -22107,7 +22826,17 @@
             </a:r>
             <a:r>
               <a:rPr lang="hu-HU" dirty="0"/>
-              <a:t>-háló: gráf topológia + feltételes valószínűség</a:t>
+              <a:t>-háló: gráf topológia + feltételes valószín</a:t>
+            </a:r>
+            <a:r>
+              <a:rPr lang="hu-HU" dirty="0">
+                <a:latin typeface="Abadi" panose="020B0604020104020204" pitchFamily="34" charset="0"/>
+              </a:rPr>
+              <a:t>ű</a:t>
+            </a:r>
+            <a:r>
+              <a:rPr lang="hu-HU" dirty="0"/>
+              <a:t>ség</a:t>
             </a:r>
           </a:p>
           <a:p>

</xml_diff>